<commit_message>
Fix up for Build Stuff
</commit_message>
<xml_diff>
--- a/OpenAPI.pptx
+++ b/OpenAPI.pptx
@@ -17,36 +17,37 @@
     <p:sldId id="258" r:id="rId11"/>
     <p:sldId id="260" r:id="rId12"/>
     <p:sldId id="261" r:id="rId13"/>
-    <p:sldId id="259" r:id="rId14"/>
-    <p:sldId id="287" r:id="rId15"/>
-    <p:sldId id="293" r:id="rId16"/>
-    <p:sldId id="263" r:id="rId17"/>
-    <p:sldId id="264" r:id="rId18"/>
-    <p:sldId id="274" r:id="rId19"/>
-    <p:sldId id="265" r:id="rId20"/>
-    <p:sldId id="277" r:id="rId21"/>
-    <p:sldId id="273" r:id="rId22"/>
-    <p:sldId id="276" r:id="rId23"/>
-    <p:sldId id="275" r:id="rId24"/>
-    <p:sldId id="267" r:id="rId25"/>
-    <p:sldId id="285" r:id="rId26"/>
-    <p:sldId id="286" r:id="rId27"/>
-    <p:sldId id="271" r:id="rId28"/>
-    <p:sldId id="284" r:id="rId29"/>
-    <p:sldId id="272" r:id="rId30"/>
-    <p:sldId id="278" r:id="rId31"/>
-    <p:sldId id="283" r:id="rId32"/>
-    <p:sldId id="268" r:id="rId33"/>
-    <p:sldId id="279" r:id="rId34"/>
-    <p:sldId id="280" r:id="rId35"/>
-    <p:sldId id="298" r:id="rId36"/>
-    <p:sldId id="301" r:id="rId37"/>
-    <p:sldId id="269" r:id="rId38"/>
-    <p:sldId id="299" r:id="rId39"/>
-    <p:sldId id="281" r:id="rId40"/>
-    <p:sldId id="270" r:id="rId41"/>
-    <p:sldId id="295" r:id="rId42"/>
-    <p:sldId id="294" r:id="rId43"/>
+    <p:sldId id="302" r:id="rId14"/>
+    <p:sldId id="259" r:id="rId15"/>
+    <p:sldId id="287" r:id="rId16"/>
+    <p:sldId id="293" r:id="rId17"/>
+    <p:sldId id="263" r:id="rId18"/>
+    <p:sldId id="264" r:id="rId19"/>
+    <p:sldId id="274" r:id="rId20"/>
+    <p:sldId id="265" r:id="rId21"/>
+    <p:sldId id="277" r:id="rId22"/>
+    <p:sldId id="273" r:id="rId23"/>
+    <p:sldId id="276" r:id="rId24"/>
+    <p:sldId id="275" r:id="rId25"/>
+    <p:sldId id="267" r:id="rId26"/>
+    <p:sldId id="285" r:id="rId27"/>
+    <p:sldId id="286" r:id="rId28"/>
+    <p:sldId id="271" r:id="rId29"/>
+    <p:sldId id="284" r:id="rId30"/>
+    <p:sldId id="272" r:id="rId31"/>
+    <p:sldId id="278" r:id="rId32"/>
+    <p:sldId id="283" r:id="rId33"/>
+    <p:sldId id="268" r:id="rId34"/>
+    <p:sldId id="279" r:id="rId35"/>
+    <p:sldId id="280" r:id="rId36"/>
+    <p:sldId id="298" r:id="rId37"/>
+    <p:sldId id="301" r:id="rId38"/>
+    <p:sldId id="269" r:id="rId39"/>
+    <p:sldId id="299" r:id="rId40"/>
+    <p:sldId id="281" r:id="rId41"/>
+    <p:sldId id="270" r:id="rId42"/>
+    <p:sldId id="295" r:id="rId43"/>
+    <p:sldId id="294" r:id="rId44"/>
   </p:sldIdLst>
   <p:sldSz cx="12192000" cy="6858000"/>
   <p:notesSz cx="6858000" cy="9144000"/>
@@ -284,7 +285,7 @@
           <a:p>
             <a:fld id="{CAA94819-728F-480F-A909-E4598EC91444}" type="datetimeFigureOut">
               <a:rPr lang="en-GB" smtClean="0"/>
-              <a:t>13/11/2023</a:t>
+              <a:t>17/11/2023</a:t>
             </a:fld>
             <a:endParaRPr lang="en-GB"/>
           </a:p>
@@ -454,7 +455,7 @@
           <a:p>
             <a:fld id="{CAA94819-728F-480F-A909-E4598EC91444}" type="datetimeFigureOut">
               <a:rPr lang="en-GB" smtClean="0"/>
-              <a:t>13/11/2023</a:t>
+              <a:t>17/11/2023</a:t>
             </a:fld>
             <a:endParaRPr lang="en-GB"/>
           </a:p>
@@ -634,7 +635,7 @@
           <a:p>
             <a:fld id="{CAA94819-728F-480F-A909-E4598EC91444}" type="datetimeFigureOut">
               <a:rPr lang="en-GB" smtClean="0"/>
-              <a:t>13/11/2023</a:t>
+              <a:t>17/11/2023</a:t>
             </a:fld>
             <a:endParaRPr lang="en-GB"/>
           </a:p>
@@ -804,7 +805,7 @@
           <a:p>
             <a:fld id="{CAA94819-728F-480F-A909-E4598EC91444}" type="datetimeFigureOut">
               <a:rPr lang="en-GB" smtClean="0"/>
-              <a:t>13/11/2023</a:t>
+              <a:t>17/11/2023</a:t>
             </a:fld>
             <a:endParaRPr lang="en-GB"/>
           </a:p>
@@ -1050,7 +1051,7 @@
           <a:p>
             <a:fld id="{CAA94819-728F-480F-A909-E4598EC91444}" type="datetimeFigureOut">
               <a:rPr lang="en-GB" smtClean="0"/>
-              <a:t>13/11/2023</a:t>
+              <a:t>17/11/2023</a:t>
             </a:fld>
             <a:endParaRPr lang="en-GB"/>
           </a:p>
@@ -1282,7 +1283,7 @@
           <a:p>
             <a:fld id="{CAA94819-728F-480F-A909-E4598EC91444}" type="datetimeFigureOut">
               <a:rPr lang="en-GB" smtClean="0"/>
-              <a:t>13/11/2023</a:t>
+              <a:t>17/11/2023</a:t>
             </a:fld>
             <a:endParaRPr lang="en-GB"/>
           </a:p>
@@ -1649,7 +1650,7 @@
           <a:p>
             <a:fld id="{CAA94819-728F-480F-A909-E4598EC91444}" type="datetimeFigureOut">
               <a:rPr lang="en-GB" smtClean="0"/>
-              <a:t>13/11/2023</a:t>
+              <a:t>17/11/2023</a:t>
             </a:fld>
             <a:endParaRPr lang="en-GB"/>
           </a:p>
@@ -1767,7 +1768,7 @@
           <a:p>
             <a:fld id="{CAA94819-728F-480F-A909-E4598EC91444}" type="datetimeFigureOut">
               <a:rPr lang="en-GB" smtClean="0"/>
-              <a:t>13/11/2023</a:t>
+              <a:t>17/11/2023</a:t>
             </a:fld>
             <a:endParaRPr lang="en-GB"/>
           </a:p>
@@ -1862,7 +1863,7 @@
           <a:p>
             <a:fld id="{CAA94819-728F-480F-A909-E4598EC91444}" type="datetimeFigureOut">
               <a:rPr lang="en-GB" smtClean="0"/>
-              <a:t>13/11/2023</a:t>
+              <a:t>17/11/2023</a:t>
             </a:fld>
             <a:endParaRPr lang="en-GB"/>
           </a:p>
@@ -2139,7 +2140,7 @@
           <a:p>
             <a:fld id="{CAA94819-728F-480F-A909-E4598EC91444}" type="datetimeFigureOut">
               <a:rPr lang="en-GB" smtClean="0"/>
-              <a:t>13/11/2023</a:t>
+              <a:t>17/11/2023</a:t>
             </a:fld>
             <a:endParaRPr lang="en-GB"/>
           </a:p>
@@ -2396,7 +2397,7 @@
           <a:p>
             <a:fld id="{CAA94819-728F-480F-A909-E4598EC91444}" type="datetimeFigureOut">
               <a:rPr lang="en-GB" smtClean="0"/>
-              <a:t>13/11/2023</a:t>
+              <a:t>17/11/2023</a:t>
             </a:fld>
             <a:endParaRPr lang="en-GB"/>
           </a:p>
@@ -2607,7 +2608,7 @@
           <a:p>
             <a:fld id="{CAA94819-728F-480F-A909-E4598EC91444}" type="datetimeFigureOut">
               <a:rPr lang="en-GB" smtClean="0"/>
-              <a:t>13/11/2023</a:t>
+              <a:t>17/11/2023</a:t>
             </a:fld>
             <a:endParaRPr lang="en-GB"/>
           </a:p>
@@ -3470,6 +3471,89 @@
 <file path=ppt/slides/slide13.xml><?xml version="1.0" encoding="utf-8"?>
 <p:sld xmlns:a="http://schemas.openxmlformats.org/drawingml/2006/main" xmlns:r="http://schemas.openxmlformats.org/officeDocument/2006/relationships" xmlns:p="http://schemas.openxmlformats.org/presentationml/2006/main">
   <p:cSld>
+    <p:spTree>
+      <p:nvGrpSpPr>
+        <p:cNvPr id="1" name=""/>
+        <p:cNvGrpSpPr/>
+        <p:nvPr/>
+      </p:nvGrpSpPr>
+      <p:grpSpPr>
+        <a:xfrm>
+          <a:off x="0" y="0"/>
+          <a:ext cx="0" cy="0"/>
+          <a:chOff x="0" y="0"/>
+          <a:chExt cx="0" cy="0"/>
+        </a:xfrm>
+      </p:grpSpPr>
+      <p:sp>
+        <p:nvSpPr>
+          <p:cNvPr id="2" name="Title 1">
+            <a:extLst>
+              <a:ext uri="{FF2B5EF4-FFF2-40B4-BE49-F238E27FC236}">
+                <a16:creationId xmlns:a16="http://schemas.microsoft.com/office/drawing/2014/main" id="{3E2592AF-3A09-0703-F280-417285D7E308}"/>
+              </a:ext>
+            </a:extLst>
+          </p:cNvPr>
+          <p:cNvSpPr>
+            <a:spLocks noGrp="1"/>
+          </p:cNvSpPr>
+          <p:nvPr>
+            <p:ph type="title"/>
+          </p:nvPr>
+        </p:nvSpPr>
+        <p:spPr/>
+        <p:txBody>
+          <a:bodyPr/>
+          <a:lstStyle/>
+          <a:p>
+            <a:r>
+              <a:rPr lang="en-GB" dirty="0"/>
+              <a:t>I am getting old</a:t>
+            </a:r>
+          </a:p>
+        </p:txBody>
+      </p:sp>
+      <p:sp>
+        <p:nvSpPr>
+          <p:cNvPr id="3" name="Text Placeholder 2">
+            <a:extLst>
+              <a:ext uri="{FF2B5EF4-FFF2-40B4-BE49-F238E27FC236}">
+                <a16:creationId xmlns:a16="http://schemas.microsoft.com/office/drawing/2014/main" id="{7F07B8AD-C0C4-4F0E-9589-66CDA08342D5}"/>
+              </a:ext>
+            </a:extLst>
+          </p:cNvPr>
+          <p:cNvSpPr>
+            <a:spLocks noGrp="1"/>
+          </p:cNvSpPr>
+          <p:nvPr>
+            <p:ph type="body" idx="1"/>
+          </p:nvPr>
+        </p:nvSpPr>
+        <p:spPr/>
+        <p:txBody>
+          <a:bodyPr/>
+          <a:lstStyle/>
+          <a:p>
+            <a:endParaRPr lang="en-GB"/>
+          </a:p>
+        </p:txBody>
+      </p:sp>
+    </p:spTree>
+    <p:extLst>
+      <p:ext uri="{BB962C8B-B14F-4D97-AF65-F5344CB8AC3E}">
+        <p14:creationId xmlns:p14="http://schemas.microsoft.com/office/powerpoint/2010/main" val="4043463641"/>
+      </p:ext>
+    </p:extLst>
+  </p:cSld>
+  <p:clrMapOvr>
+    <a:masterClrMapping/>
+  </p:clrMapOvr>
+</p:sld>
+</file>
+
+<file path=ppt/slides/slide14.xml><?xml version="1.0" encoding="utf-8"?>
+<p:sld xmlns:a="http://schemas.openxmlformats.org/drawingml/2006/main" xmlns:r="http://schemas.openxmlformats.org/officeDocument/2006/relationships" xmlns:p="http://schemas.openxmlformats.org/presentationml/2006/main">
+  <p:cSld>
     <p:bg>
       <p:bgPr>
         <a:solidFill>
@@ -3552,7 +3636,7 @@
 </p:sld>
 </file>
 
-<file path=ppt/slides/slide14.xml><?xml version="1.0" encoding="utf-8"?>
+<file path=ppt/slides/slide15.xml><?xml version="1.0" encoding="utf-8"?>
 <p:sld xmlns:a="http://schemas.openxmlformats.org/drawingml/2006/main" xmlns:r="http://schemas.openxmlformats.org/officeDocument/2006/relationships" xmlns:p="http://schemas.openxmlformats.org/presentationml/2006/main">
   <p:cSld>
     <p:spTree>
@@ -4161,7 +4245,7 @@
 </p:sld>
 </file>
 
-<file path=ppt/slides/slide15.xml><?xml version="1.0" encoding="utf-8"?>
+<file path=ppt/slides/slide16.xml><?xml version="1.0" encoding="utf-8"?>
 <p:sld xmlns:a="http://schemas.openxmlformats.org/drawingml/2006/main" xmlns:r="http://schemas.openxmlformats.org/officeDocument/2006/relationships" xmlns:p="http://schemas.openxmlformats.org/presentationml/2006/main">
   <p:cSld>
     <p:spTree>
@@ -4256,7 +4340,7 @@
 </p:sld>
 </file>
 
-<file path=ppt/slides/slide16.xml><?xml version="1.0" encoding="utf-8"?>
+<file path=ppt/slides/slide17.xml><?xml version="1.0" encoding="utf-8"?>
 <p:sld xmlns:a="http://schemas.openxmlformats.org/drawingml/2006/main" xmlns:r="http://schemas.openxmlformats.org/officeDocument/2006/relationships" xmlns:p="http://schemas.openxmlformats.org/presentationml/2006/main">
   <p:cSld>
     <p:spTree>
@@ -4351,89 +4435,6 @@
 </p:sld>
 </file>
 
-<file path=ppt/slides/slide17.xml><?xml version="1.0" encoding="utf-8"?>
-<p:sld xmlns:a="http://schemas.openxmlformats.org/drawingml/2006/main" xmlns:r="http://schemas.openxmlformats.org/officeDocument/2006/relationships" xmlns:p="http://schemas.openxmlformats.org/presentationml/2006/main">
-  <p:cSld>
-    <p:spTree>
-      <p:nvGrpSpPr>
-        <p:cNvPr id="1" name=""/>
-        <p:cNvGrpSpPr/>
-        <p:nvPr/>
-      </p:nvGrpSpPr>
-      <p:grpSpPr>
-        <a:xfrm>
-          <a:off x="0" y="0"/>
-          <a:ext cx="0" cy="0"/>
-          <a:chOff x="0" y="0"/>
-          <a:chExt cx="0" cy="0"/>
-        </a:xfrm>
-      </p:grpSpPr>
-      <p:sp>
-        <p:nvSpPr>
-          <p:cNvPr id="2" name="Title 1">
-            <a:extLst>
-              <a:ext uri="{FF2B5EF4-FFF2-40B4-BE49-F238E27FC236}">
-                <a16:creationId xmlns:a16="http://schemas.microsoft.com/office/drawing/2014/main" id="{4EF03EDA-FD97-7B63-8C42-0AC11307F9C0}"/>
-              </a:ext>
-            </a:extLst>
-          </p:cNvPr>
-          <p:cNvSpPr>
-            <a:spLocks noGrp="1"/>
-          </p:cNvSpPr>
-          <p:nvPr>
-            <p:ph type="title"/>
-          </p:nvPr>
-        </p:nvSpPr>
-        <p:spPr/>
-        <p:txBody>
-          <a:bodyPr/>
-          <a:lstStyle/>
-          <a:p>
-            <a:r>
-              <a:rPr lang="en-GB" dirty="0"/>
-              <a:t>Paths</a:t>
-            </a:r>
-          </a:p>
-        </p:txBody>
-      </p:sp>
-      <p:sp>
-        <p:nvSpPr>
-          <p:cNvPr id="3" name="Text Placeholder 2">
-            <a:extLst>
-              <a:ext uri="{FF2B5EF4-FFF2-40B4-BE49-F238E27FC236}">
-                <a16:creationId xmlns:a16="http://schemas.microsoft.com/office/drawing/2014/main" id="{9F84FDAE-B33C-F8A9-4254-8999ACD6B548}"/>
-              </a:ext>
-            </a:extLst>
-          </p:cNvPr>
-          <p:cNvSpPr>
-            <a:spLocks noGrp="1"/>
-          </p:cNvSpPr>
-          <p:nvPr>
-            <p:ph type="body" idx="1"/>
-          </p:nvPr>
-        </p:nvSpPr>
-        <p:spPr/>
-        <p:txBody>
-          <a:bodyPr/>
-          <a:lstStyle/>
-          <a:p>
-            <a:endParaRPr lang="en-GB"/>
-          </a:p>
-        </p:txBody>
-      </p:sp>
-    </p:spTree>
-    <p:extLst>
-      <p:ext uri="{BB962C8B-B14F-4D97-AF65-F5344CB8AC3E}">
-        <p14:creationId xmlns:p14="http://schemas.microsoft.com/office/powerpoint/2010/main" val="1077859955"/>
-      </p:ext>
-    </p:extLst>
-  </p:cSld>
-  <p:clrMapOvr>
-    <a:masterClrMapping/>
-  </p:clrMapOvr>
-</p:sld>
-</file>
-
 <file path=ppt/slides/slide18.xml><?xml version="1.0" encoding="utf-8"?>
 <p:sld xmlns:a="http://schemas.openxmlformats.org/drawingml/2006/main" xmlns:r="http://schemas.openxmlformats.org/officeDocument/2006/relationships" xmlns:p="http://schemas.openxmlformats.org/presentationml/2006/main">
   <p:cSld>
@@ -4451,46 +4452,63 @@
           <a:chExt cx="0" cy="0"/>
         </a:xfrm>
       </p:grpSpPr>
-      <p:pic>
-        <p:nvPicPr>
-          <p:cNvPr id="3" name="Picture 2">
+      <p:sp>
+        <p:nvSpPr>
+          <p:cNvPr id="2" name="Title 1">
             <a:extLst>
               <a:ext uri="{FF2B5EF4-FFF2-40B4-BE49-F238E27FC236}">
-                <a16:creationId xmlns:a16="http://schemas.microsoft.com/office/drawing/2014/main" id="{20278691-2C7B-9B6B-6C83-27419A65A770}"/>
+                <a16:creationId xmlns:a16="http://schemas.microsoft.com/office/drawing/2014/main" id="{4EF03EDA-FD97-7B63-8C42-0AC11307F9C0}"/>
               </a:ext>
             </a:extLst>
           </p:cNvPr>
-          <p:cNvPicPr>
-            <a:picLocks noChangeAspect="1"/>
-          </p:cNvPicPr>
-          <p:nvPr/>
-        </p:nvPicPr>
-        <p:blipFill>
-          <a:blip r:embed="rId2">
-            <a:extLst>
-              <a:ext uri="{28A0092B-C50C-407E-A947-70E740481C1C}">
-                <a14:useLocalDpi xmlns:a14="http://schemas.microsoft.com/office/drawing/2010/main" val="0"/>
-              </a:ext>
-            </a:extLst>
-          </a:blip>
-          <a:stretch>
-            <a:fillRect/>
-          </a:stretch>
-        </p:blipFill>
-        <p:spPr>
-          <a:xfrm>
-            <a:off x="1450258" y="0"/>
-            <a:ext cx="9291484" cy="6858000"/>
-          </a:xfrm>
-          <a:prstGeom prst="rect">
-            <a:avLst/>
-          </a:prstGeom>
-        </p:spPr>
-      </p:pic>
+          <p:cNvSpPr>
+            <a:spLocks noGrp="1"/>
+          </p:cNvSpPr>
+          <p:nvPr>
+            <p:ph type="title"/>
+          </p:nvPr>
+        </p:nvSpPr>
+        <p:spPr/>
+        <p:txBody>
+          <a:bodyPr/>
+          <a:lstStyle/>
+          <a:p>
+            <a:r>
+              <a:rPr lang="en-GB" dirty="0"/>
+              <a:t>Paths</a:t>
+            </a:r>
+          </a:p>
+        </p:txBody>
+      </p:sp>
+      <p:sp>
+        <p:nvSpPr>
+          <p:cNvPr id="3" name="Text Placeholder 2">
+            <a:extLst>
+              <a:ext uri="{FF2B5EF4-FFF2-40B4-BE49-F238E27FC236}">
+                <a16:creationId xmlns:a16="http://schemas.microsoft.com/office/drawing/2014/main" id="{9F84FDAE-B33C-F8A9-4254-8999ACD6B548}"/>
+              </a:ext>
+            </a:extLst>
+          </p:cNvPr>
+          <p:cNvSpPr>
+            <a:spLocks noGrp="1"/>
+          </p:cNvSpPr>
+          <p:nvPr>
+            <p:ph type="body" idx="1"/>
+          </p:nvPr>
+        </p:nvSpPr>
+        <p:spPr/>
+        <p:txBody>
+          <a:bodyPr/>
+          <a:lstStyle/>
+          <a:p>
+            <a:endParaRPr lang="en-GB"/>
+          </a:p>
+        </p:txBody>
+      </p:sp>
     </p:spTree>
     <p:extLst>
       <p:ext uri="{BB962C8B-B14F-4D97-AF65-F5344CB8AC3E}">
-        <p14:creationId xmlns:p14="http://schemas.microsoft.com/office/powerpoint/2010/main" val="3452205298"/>
+        <p14:creationId xmlns:p14="http://schemas.microsoft.com/office/powerpoint/2010/main" val="1077859955"/>
       </p:ext>
     </p:extLst>
   </p:cSld>
@@ -4517,63 +4535,46 @@
           <a:chExt cx="0" cy="0"/>
         </a:xfrm>
       </p:grpSpPr>
-      <p:sp>
-        <p:nvSpPr>
-          <p:cNvPr id="2" name="Title 1">
+      <p:pic>
+        <p:nvPicPr>
+          <p:cNvPr id="3" name="Picture 2">
             <a:extLst>
               <a:ext uri="{FF2B5EF4-FFF2-40B4-BE49-F238E27FC236}">
-                <a16:creationId xmlns:a16="http://schemas.microsoft.com/office/drawing/2014/main" id="{74E7A29E-F7CB-8F90-FB6C-97500FBD8504}"/>
+                <a16:creationId xmlns:a16="http://schemas.microsoft.com/office/drawing/2014/main" id="{20278691-2C7B-9B6B-6C83-27419A65A770}"/>
               </a:ext>
             </a:extLst>
           </p:cNvPr>
-          <p:cNvSpPr>
-            <a:spLocks noGrp="1"/>
-          </p:cNvSpPr>
-          <p:nvPr>
-            <p:ph type="title"/>
-          </p:nvPr>
-        </p:nvSpPr>
-        <p:spPr/>
-        <p:txBody>
-          <a:bodyPr/>
-          <a:lstStyle/>
-          <a:p>
-            <a:r>
-              <a:rPr lang="en-GB" dirty="0"/>
-              <a:t>Responses</a:t>
-            </a:r>
-          </a:p>
-        </p:txBody>
-      </p:sp>
-      <p:sp>
-        <p:nvSpPr>
-          <p:cNvPr id="3" name="Text Placeholder 2">
-            <a:extLst>
-              <a:ext uri="{FF2B5EF4-FFF2-40B4-BE49-F238E27FC236}">
-                <a16:creationId xmlns:a16="http://schemas.microsoft.com/office/drawing/2014/main" id="{DE9F0BB5-4BC2-DB44-7F24-D05A668584E1}"/>
-              </a:ext>
-            </a:extLst>
-          </p:cNvPr>
-          <p:cNvSpPr>
-            <a:spLocks noGrp="1"/>
-          </p:cNvSpPr>
-          <p:nvPr>
-            <p:ph type="body" idx="1"/>
-          </p:nvPr>
-        </p:nvSpPr>
-        <p:spPr/>
-        <p:txBody>
-          <a:bodyPr/>
-          <a:lstStyle/>
-          <a:p>
-            <a:endParaRPr lang="en-GB"/>
-          </a:p>
-        </p:txBody>
-      </p:sp>
+          <p:cNvPicPr>
+            <a:picLocks noChangeAspect="1"/>
+          </p:cNvPicPr>
+          <p:nvPr/>
+        </p:nvPicPr>
+        <p:blipFill>
+          <a:blip r:embed="rId2">
+            <a:extLst>
+              <a:ext uri="{28A0092B-C50C-407E-A947-70E740481C1C}">
+                <a14:useLocalDpi xmlns:a14="http://schemas.microsoft.com/office/drawing/2010/main" val="0"/>
+              </a:ext>
+            </a:extLst>
+          </a:blip>
+          <a:stretch>
+            <a:fillRect/>
+          </a:stretch>
+        </p:blipFill>
+        <p:spPr>
+          <a:xfrm>
+            <a:off x="1450258" y="0"/>
+            <a:ext cx="9291484" cy="6858000"/>
+          </a:xfrm>
+          <a:prstGeom prst="rect">
+            <a:avLst/>
+          </a:prstGeom>
+        </p:spPr>
+      </p:pic>
     </p:spTree>
     <p:extLst>
       <p:ext uri="{BB962C8B-B14F-4D97-AF65-F5344CB8AC3E}">
-        <p14:creationId xmlns:p14="http://schemas.microsoft.com/office/powerpoint/2010/main" val="4142005799"/>
+        <p14:creationId xmlns:p14="http://schemas.microsoft.com/office/powerpoint/2010/main" val="3452205298"/>
       </p:ext>
     </p:extLst>
   </p:cSld>
@@ -4756,46 +4757,63 @@
           <a:chExt cx="0" cy="0"/>
         </a:xfrm>
       </p:grpSpPr>
-      <p:pic>
-        <p:nvPicPr>
-          <p:cNvPr id="3" name="Picture 2">
+      <p:sp>
+        <p:nvSpPr>
+          <p:cNvPr id="2" name="Title 1">
             <a:extLst>
               <a:ext uri="{FF2B5EF4-FFF2-40B4-BE49-F238E27FC236}">
-                <a16:creationId xmlns:a16="http://schemas.microsoft.com/office/drawing/2014/main" id="{A31B2884-4ED8-201A-D2EB-02390A12C3C5}"/>
+                <a16:creationId xmlns:a16="http://schemas.microsoft.com/office/drawing/2014/main" id="{74E7A29E-F7CB-8F90-FB6C-97500FBD8504}"/>
               </a:ext>
             </a:extLst>
           </p:cNvPr>
-          <p:cNvPicPr>
-            <a:picLocks noChangeAspect="1"/>
-          </p:cNvPicPr>
-          <p:nvPr/>
-        </p:nvPicPr>
-        <p:blipFill>
-          <a:blip r:embed="rId2">
-            <a:extLst>
-              <a:ext uri="{28A0092B-C50C-407E-A947-70E740481C1C}">
-                <a14:useLocalDpi xmlns:a14="http://schemas.microsoft.com/office/drawing/2010/main" val="0"/>
-              </a:ext>
-            </a:extLst>
-          </a:blip>
-          <a:stretch>
-            <a:fillRect/>
-          </a:stretch>
-        </p:blipFill>
-        <p:spPr>
-          <a:xfrm>
-            <a:off x="3288591" y="0"/>
-            <a:ext cx="5614817" cy="6858000"/>
-          </a:xfrm>
-          <a:prstGeom prst="rect">
-            <a:avLst/>
-          </a:prstGeom>
-        </p:spPr>
-      </p:pic>
+          <p:cNvSpPr>
+            <a:spLocks noGrp="1"/>
+          </p:cNvSpPr>
+          <p:nvPr>
+            <p:ph type="title"/>
+          </p:nvPr>
+        </p:nvSpPr>
+        <p:spPr/>
+        <p:txBody>
+          <a:bodyPr/>
+          <a:lstStyle/>
+          <a:p>
+            <a:r>
+              <a:rPr lang="en-GB" dirty="0"/>
+              <a:t>Responses</a:t>
+            </a:r>
+          </a:p>
+        </p:txBody>
+      </p:sp>
+      <p:sp>
+        <p:nvSpPr>
+          <p:cNvPr id="3" name="Text Placeholder 2">
+            <a:extLst>
+              <a:ext uri="{FF2B5EF4-FFF2-40B4-BE49-F238E27FC236}">
+                <a16:creationId xmlns:a16="http://schemas.microsoft.com/office/drawing/2014/main" id="{DE9F0BB5-4BC2-DB44-7F24-D05A668584E1}"/>
+              </a:ext>
+            </a:extLst>
+          </p:cNvPr>
+          <p:cNvSpPr>
+            <a:spLocks noGrp="1"/>
+          </p:cNvSpPr>
+          <p:nvPr>
+            <p:ph type="body" idx="1"/>
+          </p:nvPr>
+        </p:nvSpPr>
+        <p:spPr/>
+        <p:txBody>
+          <a:bodyPr/>
+          <a:lstStyle/>
+          <a:p>
+            <a:endParaRPr lang="en-GB"/>
+          </a:p>
+        </p:txBody>
+      </p:sp>
     </p:spTree>
     <p:extLst>
       <p:ext uri="{BB962C8B-B14F-4D97-AF65-F5344CB8AC3E}">
-        <p14:creationId xmlns:p14="http://schemas.microsoft.com/office/powerpoint/2010/main" val="218749938"/>
+        <p14:creationId xmlns:p14="http://schemas.microsoft.com/office/powerpoint/2010/main" val="4142005799"/>
       </p:ext>
     </p:extLst>
   </p:cSld>
@@ -4827,6 +4845,72 @@
           <p:cNvPr id="3" name="Picture 2">
             <a:extLst>
               <a:ext uri="{FF2B5EF4-FFF2-40B4-BE49-F238E27FC236}">
+                <a16:creationId xmlns:a16="http://schemas.microsoft.com/office/drawing/2014/main" id="{A31B2884-4ED8-201A-D2EB-02390A12C3C5}"/>
+              </a:ext>
+            </a:extLst>
+          </p:cNvPr>
+          <p:cNvPicPr>
+            <a:picLocks noChangeAspect="1"/>
+          </p:cNvPicPr>
+          <p:nvPr/>
+        </p:nvPicPr>
+        <p:blipFill>
+          <a:blip r:embed="rId2">
+            <a:extLst>
+              <a:ext uri="{28A0092B-C50C-407E-A947-70E740481C1C}">
+                <a14:useLocalDpi xmlns:a14="http://schemas.microsoft.com/office/drawing/2010/main" val="0"/>
+              </a:ext>
+            </a:extLst>
+          </a:blip>
+          <a:stretch>
+            <a:fillRect/>
+          </a:stretch>
+        </p:blipFill>
+        <p:spPr>
+          <a:xfrm>
+            <a:off x="3288591" y="0"/>
+            <a:ext cx="5614817" cy="6858000"/>
+          </a:xfrm>
+          <a:prstGeom prst="rect">
+            <a:avLst/>
+          </a:prstGeom>
+        </p:spPr>
+      </p:pic>
+    </p:spTree>
+    <p:extLst>
+      <p:ext uri="{BB962C8B-B14F-4D97-AF65-F5344CB8AC3E}">
+        <p14:creationId xmlns:p14="http://schemas.microsoft.com/office/powerpoint/2010/main" val="218749938"/>
+      </p:ext>
+    </p:extLst>
+  </p:cSld>
+  <p:clrMapOvr>
+    <a:masterClrMapping/>
+  </p:clrMapOvr>
+</p:sld>
+</file>
+
+<file path=ppt/slides/slide22.xml><?xml version="1.0" encoding="utf-8"?>
+<p:sld xmlns:a="http://schemas.openxmlformats.org/drawingml/2006/main" xmlns:r="http://schemas.openxmlformats.org/officeDocument/2006/relationships" xmlns:p="http://schemas.openxmlformats.org/presentationml/2006/main">
+  <p:cSld>
+    <p:spTree>
+      <p:nvGrpSpPr>
+        <p:cNvPr id="1" name=""/>
+        <p:cNvGrpSpPr/>
+        <p:nvPr/>
+      </p:nvGrpSpPr>
+      <p:grpSpPr>
+        <a:xfrm>
+          <a:off x="0" y="0"/>
+          <a:ext cx="0" cy="0"/>
+          <a:chOff x="0" y="0"/>
+          <a:chExt cx="0" cy="0"/>
+        </a:xfrm>
+      </p:grpSpPr>
+      <p:pic>
+        <p:nvPicPr>
+          <p:cNvPr id="3" name="Picture 2">
+            <a:extLst>
+              <a:ext uri="{FF2B5EF4-FFF2-40B4-BE49-F238E27FC236}">
                 <a16:creationId xmlns:a16="http://schemas.microsoft.com/office/drawing/2014/main" id="{29A5000D-954B-BB73-21C5-D7B483BAA07B}"/>
               </a:ext>
             </a:extLst>
@@ -4871,7 +4955,7 @@
 </p:sld>
 </file>
 
-<file path=ppt/slides/slide22.xml><?xml version="1.0" encoding="utf-8"?>
+<file path=ppt/slides/slide23.xml><?xml version="1.0" encoding="utf-8"?>
 <p:sld xmlns:a="http://schemas.openxmlformats.org/drawingml/2006/main" xmlns:r="http://schemas.openxmlformats.org/officeDocument/2006/relationships" xmlns:p="http://schemas.openxmlformats.org/presentationml/2006/main">
   <p:cSld>
     <p:spTree>
@@ -4954,7 +5038,7 @@
 </p:sld>
 </file>
 
-<file path=ppt/slides/slide23.xml><?xml version="1.0" encoding="utf-8"?>
+<file path=ppt/slides/slide24.xml><?xml version="1.0" encoding="utf-8"?>
 <p:sld xmlns:a="http://schemas.openxmlformats.org/drawingml/2006/main" xmlns:r="http://schemas.openxmlformats.org/officeDocument/2006/relationships" xmlns:p="http://schemas.openxmlformats.org/presentationml/2006/main">
   <p:cSld>
     <p:spTree>
@@ -5020,89 +5104,6 @@
 </p:sld>
 </file>
 
-<file path=ppt/slides/slide24.xml><?xml version="1.0" encoding="utf-8"?>
-<p:sld xmlns:a="http://schemas.openxmlformats.org/drawingml/2006/main" xmlns:r="http://schemas.openxmlformats.org/officeDocument/2006/relationships" xmlns:p="http://schemas.openxmlformats.org/presentationml/2006/main">
-  <p:cSld>
-    <p:spTree>
-      <p:nvGrpSpPr>
-        <p:cNvPr id="1" name=""/>
-        <p:cNvGrpSpPr/>
-        <p:nvPr/>
-      </p:nvGrpSpPr>
-      <p:grpSpPr>
-        <a:xfrm>
-          <a:off x="0" y="0"/>
-          <a:ext cx="0" cy="0"/>
-          <a:chOff x="0" y="0"/>
-          <a:chExt cx="0" cy="0"/>
-        </a:xfrm>
-      </p:grpSpPr>
-      <p:sp>
-        <p:nvSpPr>
-          <p:cNvPr id="2" name="Title 1">
-            <a:extLst>
-              <a:ext uri="{FF2B5EF4-FFF2-40B4-BE49-F238E27FC236}">
-                <a16:creationId xmlns:a16="http://schemas.microsoft.com/office/drawing/2014/main" id="{F881F197-D92A-5587-514A-AE6EA11B47F2}"/>
-              </a:ext>
-            </a:extLst>
-          </p:cNvPr>
-          <p:cNvSpPr>
-            <a:spLocks noGrp="1"/>
-          </p:cNvSpPr>
-          <p:nvPr>
-            <p:ph type="title"/>
-          </p:nvPr>
-        </p:nvSpPr>
-        <p:spPr/>
-        <p:txBody>
-          <a:bodyPr/>
-          <a:lstStyle/>
-          <a:p>
-            <a:r>
-              <a:rPr lang="en-GB" dirty="0"/>
-              <a:t>Requests</a:t>
-            </a:r>
-          </a:p>
-        </p:txBody>
-      </p:sp>
-      <p:sp>
-        <p:nvSpPr>
-          <p:cNvPr id="3" name="Text Placeholder 2">
-            <a:extLst>
-              <a:ext uri="{FF2B5EF4-FFF2-40B4-BE49-F238E27FC236}">
-                <a16:creationId xmlns:a16="http://schemas.microsoft.com/office/drawing/2014/main" id="{68BD869B-2C74-3285-8002-08C7D0ADF9A0}"/>
-              </a:ext>
-            </a:extLst>
-          </p:cNvPr>
-          <p:cNvSpPr>
-            <a:spLocks noGrp="1"/>
-          </p:cNvSpPr>
-          <p:nvPr>
-            <p:ph type="body" idx="1"/>
-          </p:nvPr>
-        </p:nvSpPr>
-        <p:spPr/>
-        <p:txBody>
-          <a:bodyPr/>
-          <a:lstStyle/>
-          <a:p>
-            <a:endParaRPr lang="en-GB"/>
-          </a:p>
-        </p:txBody>
-      </p:sp>
-    </p:spTree>
-    <p:extLst>
-      <p:ext uri="{BB962C8B-B14F-4D97-AF65-F5344CB8AC3E}">
-        <p14:creationId xmlns:p14="http://schemas.microsoft.com/office/powerpoint/2010/main" val="3718225382"/>
-      </p:ext>
-    </p:extLst>
-  </p:cSld>
-  <p:clrMapOvr>
-    <a:masterClrMapping/>
-  </p:clrMapOvr>
-</p:sld>
-</file>
-
 <file path=ppt/slides/slide25.xml><?xml version="1.0" encoding="utf-8"?>
 <p:sld xmlns:a="http://schemas.openxmlformats.org/drawingml/2006/main" xmlns:r="http://schemas.openxmlformats.org/officeDocument/2006/relationships" xmlns:p="http://schemas.openxmlformats.org/presentationml/2006/main">
   <p:cSld>
@@ -5120,46 +5121,63 @@
           <a:chExt cx="0" cy="0"/>
         </a:xfrm>
       </p:grpSpPr>
-      <p:pic>
-        <p:nvPicPr>
-          <p:cNvPr id="7" name="Picture 6" descr="Text&#10;&#10;Description automatically generated">
+      <p:sp>
+        <p:nvSpPr>
+          <p:cNvPr id="2" name="Title 1">
             <a:extLst>
               <a:ext uri="{FF2B5EF4-FFF2-40B4-BE49-F238E27FC236}">
-                <a16:creationId xmlns:a16="http://schemas.microsoft.com/office/drawing/2014/main" id="{E16CFAC7-075C-156B-F358-A73D8E12E098}"/>
+                <a16:creationId xmlns:a16="http://schemas.microsoft.com/office/drawing/2014/main" id="{F881F197-D92A-5587-514A-AE6EA11B47F2}"/>
               </a:ext>
             </a:extLst>
           </p:cNvPr>
-          <p:cNvPicPr>
-            <a:picLocks noChangeAspect="1"/>
-          </p:cNvPicPr>
-          <p:nvPr/>
-        </p:nvPicPr>
-        <p:blipFill>
-          <a:blip r:embed="rId2">
-            <a:extLst>
-              <a:ext uri="{28A0092B-C50C-407E-A947-70E740481C1C}">
-                <a14:useLocalDpi xmlns:a14="http://schemas.microsoft.com/office/drawing/2010/main" val="0"/>
-              </a:ext>
-            </a:extLst>
-          </a:blip>
-          <a:stretch>
-            <a:fillRect/>
-          </a:stretch>
-        </p:blipFill>
-        <p:spPr>
-          <a:xfrm>
-            <a:off x="3055313" y="0"/>
-            <a:ext cx="6081374" cy="6858000"/>
-          </a:xfrm>
-          <a:prstGeom prst="rect">
-            <a:avLst/>
-          </a:prstGeom>
-        </p:spPr>
-      </p:pic>
+          <p:cNvSpPr>
+            <a:spLocks noGrp="1"/>
+          </p:cNvSpPr>
+          <p:nvPr>
+            <p:ph type="title"/>
+          </p:nvPr>
+        </p:nvSpPr>
+        <p:spPr/>
+        <p:txBody>
+          <a:bodyPr/>
+          <a:lstStyle/>
+          <a:p>
+            <a:r>
+              <a:rPr lang="en-GB" dirty="0"/>
+              <a:t>Requests</a:t>
+            </a:r>
+          </a:p>
+        </p:txBody>
+      </p:sp>
+      <p:sp>
+        <p:nvSpPr>
+          <p:cNvPr id="3" name="Text Placeholder 2">
+            <a:extLst>
+              <a:ext uri="{FF2B5EF4-FFF2-40B4-BE49-F238E27FC236}">
+                <a16:creationId xmlns:a16="http://schemas.microsoft.com/office/drawing/2014/main" id="{68BD869B-2C74-3285-8002-08C7D0ADF9A0}"/>
+              </a:ext>
+            </a:extLst>
+          </p:cNvPr>
+          <p:cNvSpPr>
+            <a:spLocks noGrp="1"/>
+          </p:cNvSpPr>
+          <p:nvPr>
+            <p:ph type="body" idx="1"/>
+          </p:nvPr>
+        </p:nvSpPr>
+        <p:spPr/>
+        <p:txBody>
+          <a:bodyPr/>
+          <a:lstStyle/>
+          <a:p>
+            <a:endParaRPr lang="en-GB"/>
+          </a:p>
+        </p:txBody>
+      </p:sp>
     </p:spTree>
     <p:extLst>
       <p:ext uri="{BB962C8B-B14F-4D97-AF65-F5344CB8AC3E}">
-        <p14:creationId xmlns:p14="http://schemas.microsoft.com/office/powerpoint/2010/main" val="2225673593"/>
+        <p14:creationId xmlns:p14="http://schemas.microsoft.com/office/powerpoint/2010/main" val="3718225382"/>
       </p:ext>
     </p:extLst>
   </p:cSld>
@@ -5186,63 +5204,40 @@
           <a:chExt cx="0" cy="0"/>
         </a:xfrm>
       </p:grpSpPr>
-      <p:sp>
-        <p:nvSpPr>
-          <p:cNvPr id="2" name="Title 1">
+      <p:pic>
+        <p:nvPicPr>
+          <p:cNvPr id="3" name="Picture 2">
             <a:extLst>
               <a:ext uri="{FF2B5EF4-FFF2-40B4-BE49-F238E27FC236}">
-                <a16:creationId xmlns:a16="http://schemas.microsoft.com/office/drawing/2014/main" id="{AB1909BC-ECAC-9925-6834-0233827C568D}"/>
+                <a16:creationId xmlns:a16="http://schemas.microsoft.com/office/drawing/2014/main" id="{4AA8FFAC-5062-7074-7EFD-20CBA29BDD4C}"/>
               </a:ext>
             </a:extLst>
           </p:cNvPr>
-          <p:cNvSpPr>
-            <a:spLocks noGrp="1"/>
-          </p:cNvSpPr>
-          <p:nvPr>
-            <p:ph type="title"/>
-          </p:nvPr>
-        </p:nvSpPr>
-        <p:spPr/>
-        <p:txBody>
-          <a:bodyPr/>
-          <a:lstStyle/>
-          <a:p>
-            <a:r>
-              <a:rPr lang="en-GB" dirty="0"/>
-              <a:t>Components</a:t>
-            </a:r>
-          </a:p>
-        </p:txBody>
-      </p:sp>
-      <p:sp>
-        <p:nvSpPr>
-          <p:cNvPr id="3" name="Text Placeholder 2">
-            <a:extLst>
-              <a:ext uri="{FF2B5EF4-FFF2-40B4-BE49-F238E27FC236}">
-                <a16:creationId xmlns:a16="http://schemas.microsoft.com/office/drawing/2014/main" id="{C318A013-F4FB-B134-BDCB-3BCE6963A496}"/>
-              </a:ext>
-            </a:extLst>
-          </p:cNvPr>
-          <p:cNvSpPr>
-            <a:spLocks noGrp="1"/>
-          </p:cNvSpPr>
-          <p:nvPr>
-            <p:ph type="body" idx="1"/>
-          </p:nvPr>
-        </p:nvSpPr>
-        <p:spPr/>
-        <p:txBody>
-          <a:bodyPr/>
-          <a:lstStyle/>
-          <a:p>
-            <a:endParaRPr lang="en-GB"/>
-          </a:p>
-        </p:txBody>
-      </p:sp>
+          <p:cNvPicPr>
+            <a:picLocks noChangeAspect="1"/>
+          </p:cNvPicPr>
+          <p:nvPr/>
+        </p:nvPicPr>
+        <p:blipFill>
+          <a:blip r:embed="rId2"/>
+          <a:stretch>
+            <a:fillRect/>
+          </a:stretch>
+        </p:blipFill>
+        <p:spPr>
+          <a:xfrm>
+            <a:off x="3398520" y="0"/>
+            <a:ext cx="5394960" cy="6858000"/>
+          </a:xfrm>
+          <a:prstGeom prst="rect">
+            <a:avLst/>
+          </a:prstGeom>
+        </p:spPr>
+      </p:pic>
     </p:spTree>
     <p:extLst>
       <p:ext uri="{BB962C8B-B14F-4D97-AF65-F5344CB8AC3E}">
-        <p14:creationId xmlns:p14="http://schemas.microsoft.com/office/powerpoint/2010/main" val="1897774868"/>
+        <p14:creationId xmlns:p14="http://schemas.microsoft.com/office/powerpoint/2010/main" val="2225673593"/>
       </p:ext>
     </p:extLst>
   </p:cSld>
@@ -5274,7 +5269,7 @@
           <p:cNvPr id="2" name="Title 1">
             <a:extLst>
               <a:ext uri="{FF2B5EF4-FFF2-40B4-BE49-F238E27FC236}">
-                <a16:creationId xmlns:a16="http://schemas.microsoft.com/office/drawing/2014/main" id="{B33D1E5F-D66B-7876-C363-1BA90D8996F0}"/>
+                <a16:creationId xmlns:a16="http://schemas.microsoft.com/office/drawing/2014/main" id="{AB1909BC-ECAC-9925-6834-0233827C568D}"/>
               </a:ext>
             </a:extLst>
           </p:cNvPr>
@@ -5299,10 +5294,10 @@
       </p:sp>
       <p:sp>
         <p:nvSpPr>
-          <p:cNvPr id="3" name="Content Placeholder 2">
+          <p:cNvPr id="3" name="Text Placeholder 2">
             <a:extLst>
               <a:ext uri="{FF2B5EF4-FFF2-40B4-BE49-F238E27FC236}">
-                <a16:creationId xmlns:a16="http://schemas.microsoft.com/office/drawing/2014/main" id="{8A2AA6D6-83A8-7AFF-1C05-0AA103E996DF}"/>
+                <a16:creationId xmlns:a16="http://schemas.microsoft.com/office/drawing/2014/main" id="{C318A013-F4FB-B134-BDCB-3BCE6963A496}"/>
               </a:ext>
             </a:extLst>
           </p:cNvPr>
@@ -5310,81 +5305,22 @@
             <a:spLocks noGrp="1"/>
           </p:cNvSpPr>
           <p:nvPr>
-            <p:ph idx="1"/>
-          </p:nvPr>
-        </p:nvSpPr>
-        <p:spPr/>
-        <p:txBody>
-          <a:bodyPr>
-            <a:normAutofit lnSpcReduction="10000"/>
-          </a:bodyPr>
-          <a:lstStyle/>
-          <a:p>
-            <a:r>
-              <a:rPr lang="en-GB" dirty="0"/>
-              <a:t>schemas</a:t>
-            </a:r>
-          </a:p>
-          <a:p>
-            <a:r>
-              <a:rPr lang="en-GB" dirty="0"/>
-              <a:t>responses</a:t>
-            </a:r>
-          </a:p>
-          <a:p>
-            <a:r>
-              <a:rPr lang="en-GB" dirty="0" err="1"/>
-              <a:t>requestBodies</a:t>
-            </a:r>
-            <a:endParaRPr lang="en-GB" dirty="0"/>
-          </a:p>
-          <a:p>
-            <a:r>
-              <a:rPr lang="en-GB" dirty="0"/>
-              <a:t>parameters</a:t>
-            </a:r>
-          </a:p>
-          <a:p>
-            <a:r>
-              <a:rPr lang="en-GB" dirty="0"/>
-              <a:t>headers</a:t>
-            </a:r>
-          </a:p>
-          <a:p>
-            <a:r>
-              <a:rPr lang="en-GB" dirty="0" err="1"/>
-              <a:t>securitySchemes</a:t>
-            </a:r>
-            <a:endParaRPr lang="en-GB" dirty="0"/>
-          </a:p>
-          <a:p>
-            <a:r>
-              <a:rPr lang="en-GB" dirty="0"/>
-              <a:t>examples</a:t>
-            </a:r>
-          </a:p>
-          <a:p>
-            <a:r>
-              <a:rPr lang="en-GB" dirty="0"/>
-              <a:t>links</a:t>
-            </a:r>
-          </a:p>
-          <a:p>
-            <a:r>
-              <a:rPr lang="en-GB" dirty="0" err="1"/>
-              <a:t>callbacks</a:t>
-            </a:r>
-            <a:endParaRPr lang="en-GB" dirty="0"/>
-          </a:p>
-          <a:p>
-            <a:endParaRPr lang="en-GB" dirty="0"/>
+            <p:ph type="body" idx="1"/>
+          </p:nvPr>
+        </p:nvSpPr>
+        <p:spPr/>
+        <p:txBody>
+          <a:bodyPr/>
+          <a:lstStyle/>
+          <a:p>
+            <a:endParaRPr lang="en-GB"/>
           </a:p>
         </p:txBody>
       </p:sp>
     </p:spTree>
     <p:extLst>
       <p:ext uri="{BB962C8B-B14F-4D97-AF65-F5344CB8AC3E}">
-        <p14:creationId xmlns:p14="http://schemas.microsoft.com/office/powerpoint/2010/main" val="2550684943"/>
+        <p14:creationId xmlns:p14="http://schemas.microsoft.com/office/powerpoint/2010/main" val="1897774868"/>
       </p:ext>
     </p:extLst>
   </p:cSld>
@@ -5411,46 +5347,122 @@
           <a:chExt cx="0" cy="0"/>
         </a:xfrm>
       </p:grpSpPr>
-      <p:pic>
-        <p:nvPicPr>
-          <p:cNvPr id="3" name="Picture 2" descr="Text&#10;&#10;Description automatically generated">
+      <p:sp>
+        <p:nvSpPr>
+          <p:cNvPr id="2" name="Title 1">
             <a:extLst>
               <a:ext uri="{FF2B5EF4-FFF2-40B4-BE49-F238E27FC236}">
-                <a16:creationId xmlns:a16="http://schemas.microsoft.com/office/drawing/2014/main" id="{E442CA6F-8CA7-684C-3037-D31F02EC1A4F}"/>
+                <a16:creationId xmlns:a16="http://schemas.microsoft.com/office/drawing/2014/main" id="{B33D1E5F-D66B-7876-C363-1BA90D8996F0}"/>
               </a:ext>
             </a:extLst>
           </p:cNvPr>
-          <p:cNvPicPr>
-            <a:picLocks noChangeAspect="1"/>
-          </p:cNvPicPr>
-          <p:nvPr/>
-        </p:nvPicPr>
-        <p:blipFill>
-          <a:blip r:embed="rId2">
-            <a:extLst>
-              <a:ext uri="{28A0092B-C50C-407E-A947-70E740481C1C}">
-                <a14:useLocalDpi xmlns:a14="http://schemas.microsoft.com/office/drawing/2010/main" val="0"/>
-              </a:ext>
-            </a:extLst>
-          </a:blip>
-          <a:stretch>
-            <a:fillRect/>
-          </a:stretch>
-        </p:blipFill>
-        <p:spPr>
-          <a:xfrm>
-            <a:off x="2926900" y="0"/>
-            <a:ext cx="6338200" cy="6858000"/>
-          </a:xfrm>
-          <a:prstGeom prst="rect">
-            <a:avLst/>
-          </a:prstGeom>
-        </p:spPr>
-      </p:pic>
+          <p:cNvSpPr>
+            <a:spLocks noGrp="1"/>
+          </p:cNvSpPr>
+          <p:nvPr>
+            <p:ph type="title"/>
+          </p:nvPr>
+        </p:nvSpPr>
+        <p:spPr/>
+        <p:txBody>
+          <a:bodyPr/>
+          <a:lstStyle/>
+          <a:p>
+            <a:r>
+              <a:rPr lang="en-GB" dirty="0"/>
+              <a:t>Components</a:t>
+            </a:r>
+          </a:p>
+        </p:txBody>
+      </p:sp>
+      <p:sp>
+        <p:nvSpPr>
+          <p:cNvPr id="3" name="Content Placeholder 2">
+            <a:extLst>
+              <a:ext uri="{FF2B5EF4-FFF2-40B4-BE49-F238E27FC236}">
+                <a16:creationId xmlns:a16="http://schemas.microsoft.com/office/drawing/2014/main" id="{8A2AA6D6-83A8-7AFF-1C05-0AA103E996DF}"/>
+              </a:ext>
+            </a:extLst>
+          </p:cNvPr>
+          <p:cNvSpPr>
+            <a:spLocks noGrp="1"/>
+          </p:cNvSpPr>
+          <p:nvPr>
+            <p:ph idx="1"/>
+          </p:nvPr>
+        </p:nvSpPr>
+        <p:spPr/>
+        <p:txBody>
+          <a:bodyPr>
+            <a:normAutofit lnSpcReduction="10000"/>
+          </a:bodyPr>
+          <a:lstStyle/>
+          <a:p>
+            <a:r>
+              <a:rPr lang="en-GB" dirty="0"/>
+              <a:t>schemas</a:t>
+            </a:r>
+          </a:p>
+          <a:p>
+            <a:r>
+              <a:rPr lang="en-GB" dirty="0"/>
+              <a:t>responses</a:t>
+            </a:r>
+          </a:p>
+          <a:p>
+            <a:r>
+              <a:rPr lang="en-GB" dirty="0" err="1"/>
+              <a:t>requestBodies</a:t>
+            </a:r>
+            <a:endParaRPr lang="en-GB" dirty="0"/>
+          </a:p>
+          <a:p>
+            <a:r>
+              <a:rPr lang="en-GB" dirty="0"/>
+              <a:t>parameters</a:t>
+            </a:r>
+          </a:p>
+          <a:p>
+            <a:r>
+              <a:rPr lang="en-GB" dirty="0"/>
+              <a:t>headers</a:t>
+            </a:r>
+          </a:p>
+          <a:p>
+            <a:r>
+              <a:rPr lang="en-GB" dirty="0" err="1"/>
+              <a:t>securitySchemes</a:t>
+            </a:r>
+            <a:endParaRPr lang="en-GB" dirty="0"/>
+          </a:p>
+          <a:p>
+            <a:r>
+              <a:rPr lang="en-GB" dirty="0"/>
+              <a:t>examples</a:t>
+            </a:r>
+          </a:p>
+          <a:p>
+            <a:r>
+              <a:rPr lang="en-GB" dirty="0"/>
+              <a:t>links</a:t>
+            </a:r>
+          </a:p>
+          <a:p>
+            <a:r>
+              <a:rPr lang="en-GB" dirty="0" err="1"/>
+              <a:t>callbacks</a:t>
+            </a:r>
+            <a:endParaRPr lang="en-GB" dirty="0"/>
+          </a:p>
+          <a:p>
+            <a:endParaRPr lang="en-GB" dirty="0"/>
+          </a:p>
+        </p:txBody>
+      </p:sp>
     </p:spTree>
     <p:extLst>
       <p:ext uri="{BB962C8B-B14F-4D97-AF65-F5344CB8AC3E}">
-        <p14:creationId xmlns:p14="http://schemas.microsoft.com/office/powerpoint/2010/main" val="957555142"/>
+        <p14:creationId xmlns:p14="http://schemas.microsoft.com/office/powerpoint/2010/main" val="2550684943"/>
       </p:ext>
     </p:extLst>
   </p:cSld>
@@ -5477,63 +5489,46 @@
           <a:chExt cx="0" cy="0"/>
         </a:xfrm>
       </p:grpSpPr>
-      <p:sp>
-        <p:nvSpPr>
-          <p:cNvPr id="2" name="Title 1">
+      <p:pic>
+        <p:nvPicPr>
+          <p:cNvPr id="3" name="Picture 2" descr="Text&#10;&#10;Description automatically generated">
             <a:extLst>
               <a:ext uri="{FF2B5EF4-FFF2-40B4-BE49-F238E27FC236}">
-                <a16:creationId xmlns:a16="http://schemas.microsoft.com/office/drawing/2014/main" id="{C28B94A2-9E9A-E136-741D-D279A3BCBF17}"/>
+                <a16:creationId xmlns:a16="http://schemas.microsoft.com/office/drawing/2014/main" id="{E442CA6F-8CA7-684C-3037-D31F02EC1A4F}"/>
               </a:ext>
             </a:extLst>
           </p:cNvPr>
-          <p:cNvSpPr>
-            <a:spLocks noGrp="1"/>
-          </p:cNvSpPr>
-          <p:nvPr>
-            <p:ph type="title"/>
-          </p:nvPr>
-        </p:nvSpPr>
-        <p:spPr/>
-        <p:txBody>
-          <a:bodyPr/>
-          <a:lstStyle/>
-          <a:p>
-            <a:r>
-              <a:rPr lang="en-GB" dirty="0"/>
-              <a:t>References</a:t>
-            </a:r>
-          </a:p>
-        </p:txBody>
-      </p:sp>
-      <p:sp>
-        <p:nvSpPr>
-          <p:cNvPr id="6" name="Text Placeholder 5">
-            <a:extLst>
-              <a:ext uri="{FF2B5EF4-FFF2-40B4-BE49-F238E27FC236}">
-                <a16:creationId xmlns:a16="http://schemas.microsoft.com/office/drawing/2014/main" id="{67A09604-DFFF-AB48-52D4-AA5824847FD4}"/>
-              </a:ext>
-            </a:extLst>
-          </p:cNvPr>
-          <p:cNvSpPr>
-            <a:spLocks noGrp="1"/>
-          </p:cNvSpPr>
-          <p:nvPr>
-            <p:ph type="body" idx="1"/>
-          </p:nvPr>
-        </p:nvSpPr>
-        <p:spPr/>
-        <p:txBody>
-          <a:bodyPr/>
-          <a:lstStyle/>
-          <a:p>
-            <a:endParaRPr lang="en-GB"/>
-          </a:p>
-        </p:txBody>
-      </p:sp>
+          <p:cNvPicPr>
+            <a:picLocks noChangeAspect="1"/>
+          </p:cNvPicPr>
+          <p:nvPr/>
+        </p:nvPicPr>
+        <p:blipFill>
+          <a:blip r:embed="rId2">
+            <a:extLst>
+              <a:ext uri="{28A0092B-C50C-407E-A947-70E740481C1C}">
+                <a14:useLocalDpi xmlns:a14="http://schemas.microsoft.com/office/drawing/2010/main" val="0"/>
+              </a:ext>
+            </a:extLst>
+          </a:blip>
+          <a:stretch>
+            <a:fillRect/>
+          </a:stretch>
+        </p:blipFill>
+        <p:spPr>
+          <a:xfrm>
+            <a:off x="2926900" y="0"/>
+            <a:ext cx="6338200" cy="6858000"/>
+          </a:xfrm>
+          <a:prstGeom prst="rect">
+            <a:avLst/>
+          </a:prstGeom>
+        </p:spPr>
+      </p:pic>
     </p:spTree>
     <p:extLst>
       <p:ext uri="{BB962C8B-B14F-4D97-AF65-F5344CB8AC3E}">
-        <p14:creationId xmlns:p14="http://schemas.microsoft.com/office/powerpoint/2010/main" val="836469107"/>
+        <p14:creationId xmlns:p14="http://schemas.microsoft.com/office/powerpoint/2010/main" val="957555142"/>
       </p:ext>
     </p:extLst>
   </p:cSld>
@@ -5697,6 +5692,89 @@
           <a:chExt cx="0" cy="0"/>
         </a:xfrm>
       </p:grpSpPr>
+      <p:sp>
+        <p:nvSpPr>
+          <p:cNvPr id="2" name="Title 1">
+            <a:extLst>
+              <a:ext uri="{FF2B5EF4-FFF2-40B4-BE49-F238E27FC236}">
+                <a16:creationId xmlns:a16="http://schemas.microsoft.com/office/drawing/2014/main" id="{C28B94A2-9E9A-E136-741D-D279A3BCBF17}"/>
+              </a:ext>
+            </a:extLst>
+          </p:cNvPr>
+          <p:cNvSpPr>
+            <a:spLocks noGrp="1"/>
+          </p:cNvSpPr>
+          <p:nvPr>
+            <p:ph type="title"/>
+          </p:nvPr>
+        </p:nvSpPr>
+        <p:spPr/>
+        <p:txBody>
+          <a:bodyPr/>
+          <a:lstStyle/>
+          <a:p>
+            <a:r>
+              <a:rPr lang="en-GB" dirty="0"/>
+              <a:t>References</a:t>
+            </a:r>
+          </a:p>
+        </p:txBody>
+      </p:sp>
+      <p:sp>
+        <p:nvSpPr>
+          <p:cNvPr id="6" name="Text Placeholder 5">
+            <a:extLst>
+              <a:ext uri="{FF2B5EF4-FFF2-40B4-BE49-F238E27FC236}">
+                <a16:creationId xmlns:a16="http://schemas.microsoft.com/office/drawing/2014/main" id="{67A09604-DFFF-AB48-52D4-AA5824847FD4}"/>
+              </a:ext>
+            </a:extLst>
+          </p:cNvPr>
+          <p:cNvSpPr>
+            <a:spLocks noGrp="1"/>
+          </p:cNvSpPr>
+          <p:nvPr>
+            <p:ph type="body" idx="1"/>
+          </p:nvPr>
+        </p:nvSpPr>
+        <p:spPr/>
+        <p:txBody>
+          <a:bodyPr/>
+          <a:lstStyle/>
+          <a:p>
+            <a:endParaRPr lang="en-GB"/>
+          </a:p>
+        </p:txBody>
+      </p:sp>
+    </p:spTree>
+    <p:extLst>
+      <p:ext uri="{BB962C8B-B14F-4D97-AF65-F5344CB8AC3E}">
+        <p14:creationId xmlns:p14="http://schemas.microsoft.com/office/powerpoint/2010/main" val="836469107"/>
+      </p:ext>
+    </p:extLst>
+  </p:cSld>
+  <p:clrMapOvr>
+    <a:masterClrMapping/>
+  </p:clrMapOvr>
+</p:sld>
+</file>
+
+<file path=ppt/slides/slide31.xml><?xml version="1.0" encoding="utf-8"?>
+<p:sld xmlns:a="http://schemas.openxmlformats.org/drawingml/2006/main" xmlns:r="http://schemas.openxmlformats.org/officeDocument/2006/relationships" xmlns:p="http://schemas.openxmlformats.org/presentationml/2006/main">
+  <p:cSld>
+    <p:spTree>
+      <p:nvGrpSpPr>
+        <p:cNvPr id="1" name=""/>
+        <p:cNvGrpSpPr/>
+        <p:nvPr/>
+      </p:nvGrpSpPr>
+      <p:grpSpPr>
+        <a:xfrm>
+          <a:off x="0" y="0"/>
+          <a:ext cx="0" cy="0"/>
+          <a:chOff x="0" y="0"/>
+          <a:chExt cx="0" cy="0"/>
+        </a:xfrm>
+      </p:grpSpPr>
       <p:pic>
         <p:nvPicPr>
           <p:cNvPr id="3" name="Picture 2" descr="Text&#10;&#10;Description automatically generated">
@@ -5746,7 +5824,7 @@
 </p:sld>
 </file>
 
-<file path=ppt/slides/slide31.xml><?xml version="1.0" encoding="utf-8"?>
+<file path=ppt/slides/slide32.xml><?xml version="1.0" encoding="utf-8"?>
 <p:sld xmlns:a="http://schemas.openxmlformats.org/drawingml/2006/main" xmlns:r="http://schemas.openxmlformats.org/officeDocument/2006/relationships" xmlns:p="http://schemas.openxmlformats.org/presentationml/2006/main">
   <p:cSld>
     <p:spTree>
@@ -5812,89 +5890,6 @@
 </p:sld>
 </file>
 
-<file path=ppt/slides/slide32.xml><?xml version="1.0" encoding="utf-8"?>
-<p:sld xmlns:a="http://schemas.openxmlformats.org/drawingml/2006/main" xmlns:r="http://schemas.openxmlformats.org/officeDocument/2006/relationships" xmlns:p="http://schemas.openxmlformats.org/presentationml/2006/main">
-  <p:cSld>
-    <p:spTree>
-      <p:nvGrpSpPr>
-        <p:cNvPr id="1" name=""/>
-        <p:cNvGrpSpPr/>
-        <p:nvPr/>
-      </p:nvGrpSpPr>
-      <p:grpSpPr>
-        <a:xfrm>
-          <a:off x="0" y="0"/>
-          <a:ext cx="0" cy="0"/>
-          <a:chOff x="0" y="0"/>
-          <a:chExt cx="0" cy="0"/>
-        </a:xfrm>
-      </p:grpSpPr>
-      <p:sp>
-        <p:nvSpPr>
-          <p:cNvPr id="2" name="Title 1">
-            <a:extLst>
-              <a:ext uri="{FF2B5EF4-FFF2-40B4-BE49-F238E27FC236}">
-                <a16:creationId xmlns:a16="http://schemas.microsoft.com/office/drawing/2014/main" id="{787A6BFD-B42C-E42B-054B-EFA0989B5BEC}"/>
-              </a:ext>
-            </a:extLst>
-          </p:cNvPr>
-          <p:cNvSpPr>
-            <a:spLocks noGrp="1"/>
-          </p:cNvSpPr>
-          <p:nvPr>
-            <p:ph type="title"/>
-          </p:nvPr>
-        </p:nvSpPr>
-        <p:spPr/>
-        <p:txBody>
-          <a:bodyPr/>
-          <a:lstStyle/>
-          <a:p>
-            <a:r>
-              <a:rPr lang="en-GB" dirty="0"/>
-              <a:t>Security</a:t>
-            </a:r>
-          </a:p>
-        </p:txBody>
-      </p:sp>
-      <p:sp>
-        <p:nvSpPr>
-          <p:cNvPr id="3" name="Text Placeholder 2">
-            <a:extLst>
-              <a:ext uri="{FF2B5EF4-FFF2-40B4-BE49-F238E27FC236}">
-                <a16:creationId xmlns:a16="http://schemas.microsoft.com/office/drawing/2014/main" id="{6DDA6758-E10D-5B4C-E3F3-303B0E768AA4}"/>
-              </a:ext>
-            </a:extLst>
-          </p:cNvPr>
-          <p:cNvSpPr>
-            <a:spLocks noGrp="1"/>
-          </p:cNvSpPr>
-          <p:nvPr>
-            <p:ph type="body" idx="1"/>
-          </p:nvPr>
-        </p:nvSpPr>
-        <p:spPr/>
-        <p:txBody>
-          <a:bodyPr/>
-          <a:lstStyle/>
-          <a:p>
-            <a:endParaRPr lang="en-GB"/>
-          </a:p>
-        </p:txBody>
-      </p:sp>
-    </p:spTree>
-    <p:extLst>
-      <p:ext uri="{BB962C8B-B14F-4D97-AF65-F5344CB8AC3E}">
-        <p14:creationId xmlns:p14="http://schemas.microsoft.com/office/powerpoint/2010/main" val="4241548109"/>
-      </p:ext>
-    </p:extLst>
-  </p:cSld>
-  <p:clrMapOvr>
-    <a:masterClrMapping/>
-  </p:clrMapOvr>
-</p:sld>
-</file>
-
 <file path=ppt/slides/slide33.xml><?xml version="1.0" encoding="utf-8"?>
 <p:sld xmlns:a="http://schemas.openxmlformats.org/drawingml/2006/main" xmlns:r="http://schemas.openxmlformats.org/officeDocument/2006/relationships" xmlns:p="http://schemas.openxmlformats.org/presentationml/2006/main">
   <p:cSld>
@@ -5917,6 +5912,89 @@
           <p:cNvPr id="2" name="Title 1">
             <a:extLst>
               <a:ext uri="{FF2B5EF4-FFF2-40B4-BE49-F238E27FC236}">
+                <a16:creationId xmlns:a16="http://schemas.microsoft.com/office/drawing/2014/main" id="{787A6BFD-B42C-E42B-054B-EFA0989B5BEC}"/>
+              </a:ext>
+            </a:extLst>
+          </p:cNvPr>
+          <p:cNvSpPr>
+            <a:spLocks noGrp="1"/>
+          </p:cNvSpPr>
+          <p:nvPr>
+            <p:ph type="title"/>
+          </p:nvPr>
+        </p:nvSpPr>
+        <p:spPr/>
+        <p:txBody>
+          <a:bodyPr/>
+          <a:lstStyle/>
+          <a:p>
+            <a:r>
+              <a:rPr lang="en-GB" dirty="0"/>
+              <a:t>Security</a:t>
+            </a:r>
+          </a:p>
+        </p:txBody>
+      </p:sp>
+      <p:sp>
+        <p:nvSpPr>
+          <p:cNvPr id="3" name="Text Placeholder 2">
+            <a:extLst>
+              <a:ext uri="{FF2B5EF4-FFF2-40B4-BE49-F238E27FC236}">
+                <a16:creationId xmlns:a16="http://schemas.microsoft.com/office/drawing/2014/main" id="{6DDA6758-E10D-5B4C-E3F3-303B0E768AA4}"/>
+              </a:ext>
+            </a:extLst>
+          </p:cNvPr>
+          <p:cNvSpPr>
+            <a:spLocks noGrp="1"/>
+          </p:cNvSpPr>
+          <p:nvPr>
+            <p:ph type="body" idx="1"/>
+          </p:nvPr>
+        </p:nvSpPr>
+        <p:spPr/>
+        <p:txBody>
+          <a:bodyPr/>
+          <a:lstStyle/>
+          <a:p>
+            <a:endParaRPr lang="en-GB"/>
+          </a:p>
+        </p:txBody>
+      </p:sp>
+    </p:spTree>
+    <p:extLst>
+      <p:ext uri="{BB962C8B-B14F-4D97-AF65-F5344CB8AC3E}">
+        <p14:creationId xmlns:p14="http://schemas.microsoft.com/office/powerpoint/2010/main" val="4241548109"/>
+      </p:ext>
+    </p:extLst>
+  </p:cSld>
+  <p:clrMapOvr>
+    <a:masterClrMapping/>
+  </p:clrMapOvr>
+</p:sld>
+</file>
+
+<file path=ppt/slides/slide34.xml><?xml version="1.0" encoding="utf-8"?>
+<p:sld xmlns:a="http://schemas.openxmlformats.org/drawingml/2006/main" xmlns:r="http://schemas.openxmlformats.org/officeDocument/2006/relationships" xmlns:p="http://schemas.openxmlformats.org/presentationml/2006/main">
+  <p:cSld>
+    <p:spTree>
+      <p:nvGrpSpPr>
+        <p:cNvPr id="1" name=""/>
+        <p:cNvGrpSpPr/>
+        <p:nvPr/>
+      </p:nvGrpSpPr>
+      <p:grpSpPr>
+        <a:xfrm>
+          <a:off x="0" y="0"/>
+          <a:ext cx="0" cy="0"/>
+          <a:chOff x="0" y="0"/>
+          <a:chExt cx="0" cy="0"/>
+        </a:xfrm>
+      </p:grpSpPr>
+      <p:sp>
+        <p:nvSpPr>
+          <p:cNvPr id="2" name="Title 1">
+            <a:extLst>
+              <a:ext uri="{FF2B5EF4-FFF2-40B4-BE49-F238E27FC236}">
                 <a16:creationId xmlns:a16="http://schemas.microsoft.com/office/drawing/2014/main" id="{3FE8459F-EB23-263C-3E56-239970E55B52}"/>
               </a:ext>
             </a:extLst>
@@ -5986,7 +6064,7 @@
 </p:sld>
 </file>
 
-<file path=ppt/slides/slide34.xml><?xml version="1.0" encoding="utf-8"?>
+<file path=ppt/slides/slide35.xml><?xml version="1.0" encoding="utf-8"?>
 <p:sld xmlns:a="http://schemas.openxmlformats.org/drawingml/2006/main" xmlns:r="http://schemas.openxmlformats.org/officeDocument/2006/relationships" xmlns:p="http://schemas.openxmlformats.org/presentationml/2006/main">
   <p:cSld>
     <p:spTree>
@@ -6052,7 +6130,7 @@
 </p:sld>
 </file>
 
-<file path=ppt/slides/slide35.xml><?xml version="1.0" encoding="utf-8"?>
+<file path=ppt/slides/slide36.xml><?xml version="1.0" encoding="utf-8"?>
 <p:sld xmlns:a="http://schemas.openxmlformats.org/drawingml/2006/main" xmlns:r="http://schemas.openxmlformats.org/officeDocument/2006/relationships" xmlns:p="http://schemas.openxmlformats.org/presentationml/2006/main">
   <p:cSld>
     <p:spTree>
@@ -6148,7 +6226,7 @@
 </p:sld>
 </file>
 
-<file path=ppt/slides/slide36.xml><?xml version="1.0" encoding="utf-8"?>
+<file path=ppt/slides/slide37.xml><?xml version="1.0" encoding="utf-8"?>
 <p:sld xmlns:a="http://schemas.openxmlformats.org/drawingml/2006/main" xmlns:r="http://schemas.openxmlformats.org/officeDocument/2006/relationships" xmlns:p="http://schemas.openxmlformats.org/presentationml/2006/main">
   <p:cSld>
     <p:spTree>
@@ -6239,190 +6317,6 @@
 </p:sld>
 </file>
 
-<file path=ppt/slides/slide37.xml><?xml version="1.0" encoding="utf-8"?>
-<p:sld xmlns:a="http://schemas.openxmlformats.org/drawingml/2006/main" xmlns:r="http://schemas.openxmlformats.org/officeDocument/2006/relationships" xmlns:p="http://schemas.openxmlformats.org/presentationml/2006/main">
-  <p:cSld>
-    <p:spTree>
-      <p:nvGrpSpPr>
-        <p:cNvPr id="1" name=""/>
-        <p:cNvGrpSpPr/>
-        <p:nvPr/>
-      </p:nvGrpSpPr>
-      <p:grpSpPr>
-        <a:xfrm>
-          <a:off x="0" y="0"/>
-          <a:ext cx="0" cy="0"/>
-          <a:chOff x="0" y="0"/>
-          <a:chExt cx="0" cy="0"/>
-        </a:xfrm>
-      </p:grpSpPr>
-      <p:sp>
-        <p:nvSpPr>
-          <p:cNvPr id="2" name="Title 1">
-            <a:extLst>
-              <a:ext uri="{FF2B5EF4-FFF2-40B4-BE49-F238E27FC236}">
-                <a16:creationId xmlns:a16="http://schemas.microsoft.com/office/drawing/2014/main" id="{5592EC0B-A3CD-B223-512D-74AAB33C0BA8}"/>
-              </a:ext>
-            </a:extLst>
-          </p:cNvPr>
-          <p:cNvSpPr>
-            <a:spLocks noGrp="1"/>
-          </p:cNvSpPr>
-          <p:nvPr>
-            <p:ph type="title"/>
-          </p:nvPr>
-        </p:nvSpPr>
-        <p:spPr/>
-        <p:txBody>
-          <a:bodyPr/>
-          <a:lstStyle/>
-          <a:p>
-            <a:r>
-              <a:rPr lang="en-GB" dirty="0"/>
-              <a:t>Tools</a:t>
-            </a:r>
-          </a:p>
-        </p:txBody>
-      </p:sp>
-      <p:sp>
-        <p:nvSpPr>
-          <p:cNvPr id="3" name="Content Placeholder 2">
-            <a:extLst>
-              <a:ext uri="{FF2B5EF4-FFF2-40B4-BE49-F238E27FC236}">
-                <a16:creationId xmlns:a16="http://schemas.microsoft.com/office/drawing/2014/main" id="{71B67435-0E9A-06CE-2486-38134A2A38D4}"/>
-              </a:ext>
-            </a:extLst>
-          </p:cNvPr>
-          <p:cNvSpPr>
-            <a:spLocks noGrp="1"/>
-          </p:cNvSpPr>
-          <p:nvPr>
-            <p:ph idx="1"/>
-          </p:nvPr>
-        </p:nvSpPr>
-        <p:spPr/>
-        <p:txBody>
-          <a:bodyPr>
-            <a:normAutofit/>
-          </a:bodyPr>
-          <a:lstStyle/>
-          <a:p>
-            <a:pPr>
-              <a:spcBef>
-                <a:spcPts val="3600"/>
-              </a:spcBef>
-            </a:pPr>
-            <a:r>
-              <a:rPr lang="en-GB" dirty="0"/>
-              <a:t>Swagger UI</a:t>
-            </a:r>
-          </a:p>
-          <a:p>
-            <a:pPr>
-              <a:spcBef>
-                <a:spcPts val="3600"/>
-              </a:spcBef>
-            </a:pPr>
-            <a:r>
-              <a:rPr lang="en-GB" dirty="0" err="1"/>
-              <a:t>Redoc</a:t>
-            </a:r>
-            <a:br>
-              <a:rPr lang="en-GB" dirty="0"/>
-            </a:br>
-            <a:r>
-              <a:rPr lang="en-GB" sz="1600" dirty="0">
-                <a:solidFill>
-                  <a:schemeClr val="accent2">
-                    <a:lumMod val="60000"/>
-                    <a:lumOff val="40000"/>
-                  </a:schemeClr>
-                </a:solidFill>
-              </a:rPr>
-              <a:t>github.com/</a:t>
-            </a:r>
-            <a:r>
-              <a:rPr lang="en-GB" sz="1600" dirty="0" err="1">
-                <a:solidFill>
-                  <a:schemeClr val="accent2">
-                    <a:lumMod val="60000"/>
-                    <a:lumOff val="40000"/>
-                  </a:schemeClr>
-                </a:solidFill>
-              </a:rPr>
-              <a:t>Redocly</a:t>
-            </a:r>
-            <a:r>
-              <a:rPr lang="en-GB" sz="1600" dirty="0">
-                <a:solidFill>
-                  <a:schemeClr val="accent2">
-                    <a:lumMod val="60000"/>
-                    <a:lumOff val="40000"/>
-                  </a:schemeClr>
-                </a:solidFill>
-              </a:rPr>
-              <a:t>/</a:t>
-            </a:r>
-            <a:r>
-              <a:rPr lang="en-GB" sz="1600" dirty="0" err="1">
-                <a:solidFill>
-                  <a:schemeClr val="accent2">
-                    <a:lumMod val="60000"/>
-                    <a:lumOff val="40000"/>
-                  </a:schemeClr>
-                </a:solidFill>
-              </a:rPr>
-              <a:t>redoc</a:t>
-            </a:r>
-            <a:endParaRPr lang="en-GB" sz="1600" dirty="0">
-              <a:solidFill>
-                <a:schemeClr val="accent2">
-                  <a:lumMod val="60000"/>
-                  <a:lumOff val="40000"/>
-                </a:schemeClr>
-              </a:solidFill>
-            </a:endParaRPr>
-          </a:p>
-          <a:p>
-            <a:pPr>
-              <a:spcBef>
-                <a:spcPts val="3600"/>
-              </a:spcBef>
-            </a:pPr>
-            <a:r>
-              <a:rPr lang="en-GB" dirty="0"/>
-              <a:t>Elements</a:t>
-            </a:r>
-            <a:br>
-              <a:rPr lang="en-GB" dirty="0"/>
-            </a:br>
-            <a:r>
-              <a:rPr lang="en-GB" sz="1600" dirty="0">
-                <a:solidFill>
-                  <a:schemeClr val="accent2">
-                    <a:lumMod val="60000"/>
-                    <a:lumOff val="40000"/>
-                  </a:schemeClr>
-                </a:solidFill>
-              </a:rPr>
-              <a:t>stoplight.io/open-source/elements</a:t>
-            </a:r>
-          </a:p>
-        </p:txBody>
-      </p:sp>
-    </p:spTree>
-    <p:extLst>
-      <p:ext uri="{BB962C8B-B14F-4D97-AF65-F5344CB8AC3E}">
-        <p14:creationId xmlns:p14="http://schemas.microsoft.com/office/powerpoint/2010/main" val="2893756278"/>
-      </p:ext>
-    </p:extLst>
-  </p:cSld>
-  <p:clrMapOvr>
-    <a:masterClrMapping/>
-  </p:clrMapOvr>
-</p:sld>
-</file>
-
 <file path=ppt/slides/slide38.xml><?xml version="1.0" encoding="utf-8"?>
 <p:sld xmlns:a="http://schemas.openxmlformats.org/drawingml/2006/main" xmlns:r="http://schemas.openxmlformats.org/officeDocument/2006/relationships" xmlns:p="http://schemas.openxmlformats.org/presentationml/2006/main">
   <p:cSld>
@@ -6445,7 +6339,7 @@
           <p:cNvPr id="2" name="Title 1">
             <a:extLst>
               <a:ext uri="{FF2B5EF4-FFF2-40B4-BE49-F238E27FC236}">
-                <a16:creationId xmlns:a16="http://schemas.microsoft.com/office/drawing/2014/main" id="{9EEFFF31-7CEF-80C4-C9CC-F13D181784F8}"/>
+                <a16:creationId xmlns:a16="http://schemas.microsoft.com/office/drawing/2014/main" id="{5592EC0B-A3CD-B223-512D-74AAB33C0BA8}"/>
               </a:ext>
             </a:extLst>
           </p:cNvPr>
@@ -6463,7 +6357,7 @@
           <a:p>
             <a:r>
               <a:rPr lang="en-GB" dirty="0"/>
-              <a:t>Plugins</a:t>
+              <a:t>Tools</a:t>
             </a:r>
           </a:p>
         </p:txBody>
@@ -6473,7 +6367,7 @@
           <p:cNvPr id="3" name="Content Placeholder 2">
             <a:extLst>
               <a:ext uri="{FF2B5EF4-FFF2-40B4-BE49-F238E27FC236}">
-                <a16:creationId xmlns:a16="http://schemas.microsoft.com/office/drawing/2014/main" id="{6E1F24E1-6E3B-B7E6-4BB9-1CD5A48B4BBC}"/>
+                <a16:creationId xmlns:a16="http://schemas.microsoft.com/office/drawing/2014/main" id="{71B67435-0E9A-06CE-2486-38134A2A38D4}"/>
               </a:ext>
             </a:extLst>
           </p:cNvPr>
@@ -6486,70 +6380,118 @@
         </p:nvSpPr>
         <p:spPr/>
         <p:txBody>
-          <a:bodyPr/>
-          <a:lstStyle/>
-          <a:p>
+          <a:bodyPr>
+            <a:normAutofit/>
+          </a:bodyPr>
+          <a:lstStyle/>
+          <a:p>
+            <a:pPr>
+              <a:spcBef>
+                <a:spcPts val="3600"/>
+              </a:spcBef>
+            </a:pPr>
             <a:r>
               <a:rPr lang="en-GB" dirty="0"/>
-              <a:t>VS Code: </a:t>
-            </a:r>
+              <a:t>Swagger UI</a:t>
+            </a:r>
+          </a:p>
+          <a:p>
+            <a:pPr>
+              <a:spcBef>
+                <a:spcPts val="3600"/>
+              </a:spcBef>
+            </a:pPr>
             <a:r>
               <a:rPr lang="en-GB" dirty="0" err="1"/>
-              <a:t>OpenAPI</a:t>
-            </a:r>
-            <a:r>
-              <a:rPr lang="en-GB" dirty="0"/>
-              <a:t> (Swagger) Editor</a:t>
+              <a:t>Redoc</a:t>
             </a:r>
             <a:br>
               <a:rPr lang="en-GB" dirty="0"/>
             </a:br>
-            <a:br>
-              <a:rPr lang="en-GB" sz="1800" dirty="0"/>
-            </a:br>
-            <a:r>
-              <a:rPr lang="en-GB" sz="1800" dirty="0"/>
-              <a:t>marketplace.visualstudio.com/items?itemName=42Crunch.vscode-openapi</a:t>
-            </a:r>
-            <a:br>
-              <a:rPr lang="en-GB" sz="1800" dirty="0"/>
-            </a:br>
+            <a:r>
+              <a:rPr lang="en-GB" sz="1600" dirty="0">
+                <a:solidFill>
+                  <a:schemeClr val="accent2">
+                    <a:lumMod val="60000"/>
+                    <a:lumOff val="40000"/>
+                  </a:schemeClr>
+                </a:solidFill>
+              </a:rPr>
+              <a:t>github.com/</a:t>
+            </a:r>
+            <a:r>
+              <a:rPr lang="en-GB" sz="1600" dirty="0" err="1">
+                <a:solidFill>
+                  <a:schemeClr val="accent2">
+                    <a:lumMod val="60000"/>
+                    <a:lumOff val="40000"/>
+                  </a:schemeClr>
+                </a:solidFill>
+              </a:rPr>
+              <a:t>Redocly</a:t>
+            </a:r>
+            <a:r>
+              <a:rPr lang="en-GB" sz="1600" dirty="0">
+                <a:solidFill>
+                  <a:schemeClr val="accent2">
+                    <a:lumMod val="60000"/>
+                    <a:lumOff val="40000"/>
+                  </a:schemeClr>
+                </a:solidFill>
+              </a:rPr>
+              <a:t>/</a:t>
+            </a:r>
+            <a:r>
+              <a:rPr lang="en-GB" sz="1600" dirty="0" err="1">
+                <a:solidFill>
+                  <a:schemeClr val="accent2">
+                    <a:lumMod val="60000"/>
+                    <a:lumOff val="40000"/>
+                  </a:schemeClr>
+                </a:solidFill>
+              </a:rPr>
+              <a:t>redoc</a:t>
+            </a:r>
+            <a:endParaRPr lang="en-GB" sz="1600" dirty="0">
+              <a:solidFill>
+                <a:schemeClr val="accent2">
+                  <a:lumMod val="60000"/>
+                  <a:lumOff val="40000"/>
+                </a:schemeClr>
+              </a:solidFill>
+            </a:endParaRPr>
+          </a:p>
+          <a:p>
+            <a:pPr>
+              <a:spcBef>
+                <a:spcPts val="3600"/>
+              </a:spcBef>
+            </a:pPr>
+            <a:r>
+              <a:rPr lang="en-GB" dirty="0"/>
+              <a:t>Elements</a:t>
+            </a:r>
             <a:br>
               <a:rPr lang="en-GB" dirty="0"/>
             </a:br>
-            <a:endParaRPr lang="en-GB" dirty="0"/>
-          </a:p>
-          <a:p>
-            <a:r>
-              <a:rPr lang="en-GB" dirty="0"/>
-              <a:t>Rider: </a:t>
-            </a:r>
-            <a:r>
-              <a:rPr lang="en-GB" dirty="0" err="1"/>
-              <a:t>OpenAPI</a:t>
-            </a:r>
-            <a:r>
-              <a:rPr lang="en-GB" dirty="0"/>
-              <a:t> Specifications</a:t>
-            </a:r>
-            <a:br>
-              <a:rPr lang="en-GB" dirty="0"/>
-            </a:br>
-            <a:br>
-              <a:rPr lang="en-GB" sz="1600" dirty="0"/>
-            </a:br>
-            <a:r>
-              <a:rPr lang="en-GB" sz="1600" dirty="0"/>
-              <a:t>Built-in</a:t>
-            </a:r>
-            <a:endParaRPr lang="en-GB" dirty="0"/>
+            <a:r>
+              <a:rPr lang="en-GB" sz="1600" dirty="0">
+                <a:solidFill>
+                  <a:schemeClr val="accent2">
+                    <a:lumMod val="60000"/>
+                    <a:lumOff val="40000"/>
+                  </a:schemeClr>
+                </a:solidFill>
+              </a:rPr>
+              <a:t>stoplight.io/open-source/elements</a:t>
+            </a:r>
           </a:p>
         </p:txBody>
       </p:sp>
     </p:spTree>
     <p:extLst>
       <p:ext uri="{BB962C8B-B14F-4D97-AF65-F5344CB8AC3E}">
-        <p14:creationId xmlns:p14="http://schemas.microsoft.com/office/powerpoint/2010/main" val="3171114529"/>
+        <p14:creationId xmlns:p14="http://schemas.microsoft.com/office/powerpoint/2010/main" val="2893756278"/>
       </p:ext>
     </p:extLst>
   </p:cSld>
@@ -6581,7 +6523,7 @@
           <p:cNvPr id="2" name="Title 1">
             <a:extLst>
               <a:ext uri="{FF2B5EF4-FFF2-40B4-BE49-F238E27FC236}">
-                <a16:creationId xmlns:a16="http://schemas.microsoft.com/office/drawing/2014/main" id="{C4DAB788-8FB0-FF25-28E5-B49FEED02E0C}"/>
+                <a16:creationId xmlns:a16="http://schemas.microsoft.com/office/drawing/2014/main" id="{9EEFFF31-7CEF-80C4-C9CC-F13D181784F8}"/>
               </a:ext>
             </a:extLst>
           </p:cNvPr>
@@ -6599,50 +6541,93 @@
           <a:p>
             <a:r>
               <a:rPr lang="en-GB" dirty="0"/>
-              <a:t>Bundling</a:t>
-            </a:r>
-          </a:p>
-        </p:txBody>
-      </p:sp>
-      <p:pic>
-        <p:nvPicPr>
-          <p:cNvPr id="5" name="Content Placeholder 4">
+              <a:t>Plugins</a:t>
+            </a:r>
+          </a:p>
+        </p:txBody>
+      </p:sp>
+      <p:sp>
+        <p:nvSpPr>
+          <p:cNvPr id="3" name="Content Placeholder 2">
             <a:extLst>
               <a:ext uri="{FF2B5EF4-FFF2-40B4-BE49-F238E27FC236}">
-                <a16:creationId xmlns:a16="http://schemas.microsoft.com/office/drawing/2014/main" id="{46D85B33-E466-BB66-4D80-A0E1A1DA39E0}"/>
+                <a16:creationId xmlns:a16="http://schemas.microsoft.com/office/drawing/2014/main" id="{6E1F24E1-6E3B-B7E6-4BB9-1CD5A48B4BBC}"/>
               </a:ext>
             </a:extLst>
           </p:cNvPr>
-          <p:cNvPicPr>
-            <a:picLocks noGrp="1" noChangeAspect="1"/>
-          </p:cNvPicPr>
+          <p:cNvSpPr>
+            <a:spLocks noGrp="1"/>
+          </p:cNvSpPr>
           <p:nvPr>
             <p:ph idx="1"/>
           </p:nvPr>
-        </p:nvPicPr>
-        <p:blipFill>
-          <a:blip r:embed="rId2">
-            <a:extLst>
-              <a:ext uri="{28A0092B-C50C-407E-A947-70E740481C1C}">
-                <a14:useLocalDpi xmlns:a14="http://schemas.microsoft.com/office/drawing/2010/main" val="0"/>
-              </a:ext>
-            </a:extLst>
-          </a:blip>
-          <a:stretch>
-            <a:fillRect/>
-          </a:stretch>
-        </p:blipFill>
-        <p:spPr>
-          <a:xfrm>
-            <a:off x="838200" y="2116943"/>
-            <a:ext cx="10515600" cy="3768702"/>
-          </a:xfrm>
-        </p:spPr>
-      </p:pic>
+        </p:nvSpPr>
+        <p:spPr/>
+        <p:txBody>
+          <a:bodyPr/>
+          <a:lstStyle/>
+          <a:p>
+            <a:r>
+              <a:rPr lang="en-GB" dirty="0"/>
+              <a:t>VS Code: </a:t>
+            </a:r>
+            <a:r>
+              <a:rPr lang="en-GB" dirty="0" err="1"/>
+              <a:t>OpenAPI</a:t>
+            </a:r>
+            <a:r>
+              <a:rPr lang="en-GB" dirty="0"/>
+              <a:t> (Swagger) Editor</a:t>
+            </a:r>
+            <a:br>
+              <a:rPr lang="en-GB" dirty="0"/>
+            </a:br>
+            <a:br>
+              <a:rPr lang="en-GB" sz="1800" dirty="0"/>
+            </a:br>
+            <a:r>
+              <a:rPr lang="en-GB" sz="1800" dirty="0"/>
+              <a:t>marketplace.visualstudio.com/items?itemName=42Crunch.vscode-openapi</a:t>
+            </a:r>
+            <a:br>
+              <a:rPr lang="en-GB" sz="1800" dirty="0"/>
+            </a:br>
+            <a:br>
+              <a:rPr lang="en-GB" dirty="0"/>
+            </a:br>
+            <a:endParaRPr lang="en-GB" dirty="0"/>
+          </a:p>
+          <a:p>
+            <a:r>
+              <a:rPr lang="en-GB" dirty="0"/>
+              <a:t>Rider: </a:t>
+            </a:r>
+            <a:r>
+              <a:rPr lang="en-GB" dirty="0" err="1"/>
+              <a:t>OpenAPI</a:t>
+            </a:r>
+            <a:r>
+              <a:rPr lang="en-GB" dirty="0"/>
+              <a:t> Specifications</a:t>
+            </a:r>
+            <a:br>
+              <a:rPr lang="en-GB" dirty="0"/>
+            </a:br>
+            <a:br>
+              <a:rPr lang="en-GB" sz="1600" dirty="0"/>
+            </a:br>
+            <a:r>
+              <a:rPr lang="en-GB" sz="1600" dirty="0"/>
+              <a:t>Built-in</a:t>
+            </a:r>
+            <a:endParaRPr lang="en-GB" dirty="0"/>
+          </a:p>
+        </p:txBody>
+      </p:sp>
     </p:spTree>
     <p:extLst>
       <p:ext uri="{BB962C8B-B14F-4D97-AF65-F5344CB8AC3E}">
-        <p14:creationId xmlns:p14="http://schemas.microsoft.com/office/powerpoint/2010/main" val="3713737075"/>
+        <p14:creationId xmlns:p14="http://schemas.microsoft.com/office/powerpoint/2010/main" val="3171114529"/>
       </p:ext>
     </p:extLst>
   </p:cSld>
@@ -6757,6 +6742,99 @@
           <p:cNvPr id="2" name="Title 1">
             <a:extLst>
               <a:ext uri="{FF2B5EF4-FFF2-40B4-BE49-F238E27FC236}">
+                <a16:creationId xmlns:a16="http://schemas.microsoft.com/office/drawing/2014/main" id="{C4DAB788-8FB0-FF25-28E5-B49FEED02E0C}"/>
+              </a:ext>
+            </a:extLst>
+          </p:cNvPr>
+          <p:cNvSpPr>
+            <a:spLocks noGrp="1"/>
+          </p:cNvSpPr>
+          <p:nvPr>
+            <p:ph type="title"/>
+          </p:nvPr>
+        </p:nvSpPr>
+        <p:spPr/>
+        <p:txBody>
+          <a:bodyPr/>
+          <a:lstStyle/>
+          <a:p>
+            <a:r>
+              <a:rPr lang="en-GB" dirty="0"/>
+              <a:t>Bundling</a:t>
+            </a:r>
+          </a:p>
+        </p:txBody>
+      </p:sp>
+      <p:pic>
+        <p:nvPicPr>
+          <p:cNvPr id="5" name="Content Placeholder 4">
+            <a:extLst>
+              <a:ext uri="{FF2B5EF4-FFF2-40B4-BE49-F238E27FC236}">
+                <a16:creationId xmlns:a16="http://schemas.microsoft.com/office/drawing/2014/main" id="{46D85B33-E466-BB66-4D80-A0E1A1DA39E0}"/>
+              </a:ext>
+            </a:extLst>
+          </p:cNvPr>
+          <p:cNvPicPr>
+            <a:picLocks noGrp="1" noChangeAspect="1"/>
+          </p:cNvPicPr>
+          <p:nvPr>
+            <p:ph idx="1"/>
+          </p:nvPr>
+        </p:nvPicPr>
+        <p:blipFill>
+          <a:blip r:embed="rId2">
+            <a:extLst>
+              <a:ext uri="{28A0092B-C50C-407E-A947-70E740481C1C}">
+                <a14:useLocalDpi xmlns:a14="http://schemas.microsoft.com/office/drawing/2010/main" val="0"/>
+              </a:ext>
+            </a:extLst>
+          </a:blip>
+          <a:stretch>
+            <a:fillRect/>
+          </a:stretch>
+        </p:blipFill>
+        <p:spPr>
+          <a:xfrm>
+            <a:off x="838200" y="2116943"/>
+            <a:ext cx="10515600" cy="3768702"/>
+          </a:xfrm>
+        </p:spPr>
+      </p:pic>
+    </p:spTree>
+    <p:extLst>
+      <p:ext uri="{BB962C8B-B14F-4D97-AF65-F5344CB8AC3E}">
+        <p14:creationId xmlns:p14="http://schemas.microsoft.com/office/powerpoint/2010/main" val="3713737075"/>
+      </p:ext>
+    </p:extLst>
+  </p:cSld>
+  <p:clrMapOvr>
+    <a:masterClrMapping/>
+  </p:clrMapOvr>
+</p:sld>
+</file>
+
+<file path=ppt/slides/slide41.xml><?xml version="1.0" encoding="utf-8"?>
+<p:sld xmlns:a="http://schemas.openxmlformats.org/drawingml/2006/main" xmlns:r="http://schemas.openxmlformats.org/officeDocument/2006/relationships" xmlns:p="http://schemas.openxmlformats.org/presentationml/2006/main">
+  <p:cSld>
+    <p:spTree>
+      <p:nvGrpSpPr>
+        <p:cNvPr id="1" name=""/>
+        <p:cNvGrpSpPr/>
+        <p:nvPr/>
+      </p:nvGrpSpPr>
+      <p:grpSpPr>
+        <a:xfrm>
+          <a:off x="0" y="0"/>
+          <a:ext cx="0" cy="0"/>
+          <a:chOff x="0" y="0"/>
+          <a:chExt cx="0" cy="0"/>
+        </a:xfrm>
+      </p:grpSpPr>
+      <p:sp>
+        <p:nvSpPr>
+          <p:cNvPr id="2" name="Title 1">
+            <a:extLst>
+              <a:ext uri="{FF2B5EF4-FFF2-40B4-BE49-F238E27FC236}">
                 <a16:creationId xmlns:a16="http://schemas.microsoft.com/office/drawing/2014/main" id="{99629F9A-EFA6-715B-2804-5BBE4D49E3EA}"/>
               </a:ext>
             </a:extLst>
@@ -6879,7 +6957,7 @@
 </p:sld>
 </file>
 
-<file path=ppt/slides/slide41.xml><?xml version="1.0" encoding="utf-8"?>
+<file path=ppt/slides/slide42.xml><?xml version="1.0" encoding="utf-8"?>
 <p:sld xmlns:a="http://schemas.openxmlformats.org/drawingml/2006/main" xmlns:r="http://schemas.openxmlformats.org/officeDocument/2006/relationships" xmlns:p="http://schemas.openxmlformats.org/presentationml/2006/main">
   <p:cSld>
     <p:spTree>
@@ -7080,7 +7158,7 @@
 </p:sld>
 </file>
 
-<file path=ppt/slides/slide42.xml><?xml version="1.0" encoding="utf-8"?>
+<file path=ppt/slides/slide43.xml><?xml version="1.0" encoding="utf-8"?>
 <p:sld xmlns:a="http://schemas.openxmlformats.org/drawingml/2006/main" xmlns:r="http://schemas.openxmlformats.org/officeDocument/2006/relationships" xmlns:p="http://schemas.openxmlformats.org/presentationml/2006/main">
   <p:cSld>
     <p:spTree>

</xml_diff>